<commit_message>
docs: writing pipeline documentation
</commit_message>
<xml_diff>
--- a/S4/EXP/files/pres_aurelienbarrau_5min.pptx
+++ b/S4/EXP/files/pres_aurelienbarrau_5min.pptx
@@ -104,7 +104,41 @@
       </a:defRPr>
     </a:lvl9pPr>
   </p:defaultTextStyle>
+  <p:extLst>
+    <p:ext uri="{EFAFB233-063F-42B5-8137-9DF3F51BA10A}">
+      <p15:sldGuideLst xmlns:p15="http://schemas.microsoft.com/office/powerpoint/2012/main"/>
+    </p:ext>
+  </p:extLst>
 </p:presentation>
+</file>
+
+<file path=ppt/changesInfos/changesInfo1.xml><?xml version="1.0" encoding="utf-8"?>
+<pc:chgInfo xmlns:a="http://schemas.openxmlformats.org/drawingml/2006/main" xmlns:r="http://schemas.openxmlformats.org/officeDocument/2006/relationships" xmlns:ac="http://schemas.microsoft.com/office/drawing/2013/main/command" xmlns:pc="http://schemas.microsoft.com/office/powerpoint/2013/main/command">
+  <pc:docChgLst>
+    <pc:chgData name="Trüeb Guillaume" userId="cdddf057-9811-4cdd-8552-6ae0b8a7753d" providerId="ADAL" clId="{ECDFB03D-1764-5B4F-B940-9C9F945837E9}"/>
+    <pc:docChg chg="modSld">
+      <pc:chgData name="Trüeb Guillaume" userId="cdddf057-9811-4cdd-8552-6ae0b8a7753d" providerId="ADAL" clId="{ECDFB03D-1764-5B4F-B940-9C9F945837E9}" dt="2024-04-25T11:45:57.648" v="9" actId="20577"/>
+      <pc:docMkLst>
+        <pc:docMk/>
+      </pc:docMkLst>
+      <pc:sldChg chg="modSp mod">
+        <pc:chgData name="Trüeb Guillaume" userId="cdddf057-9811-4cdd-8552-6ae0b8a7753d" providerId="ADAL" clId="{ECDFB03D-1764-5B4F-B940-9C9F945837E9}" dt="2024-04-25T11:45:57.648" v="9" actId="20577"/>
+        <pc:sldMkLst>
+          <pc:docMk/>
+          <pc:sldMk cId="624417057" sldId="256"/>
+        </pc:sldMkLst>
+        <pc:spChg chg="mod">
+          <ac:chgData name="Trüeb Guillaume" userId="cdddf057-9811-4cdd-8552-6ae0b8a7753d" providerId="ADAL" clId="{ECDFB03D-1764-5B4F-B940-9C9F945837E9}" dt="2024-04-25T11:45:57.648" v="9" actId="20577"/>
+          <ac:spMkLst>
+            <pc:docMk/>
+            <pc:sldMk cId="624417057" sldId="256"/>
+            <ac:spMk id="3" creationId="{F937CF57-DD8D-CC1A-0349-65589F61BAAE}"/>
+          </ac:spMkLst>
+        </pc:spChg>
+      </pc:sldChg>
+    </pc:docChg>
+  </pc:docChgLst>
+</pc:chgInfo>
 </file>
 
 <file path=ppt/slideLayouts/slideLayout1.xml><?xml version="1.0" encoding="utf-8"?>
@@ -253,7 +287,7 @@
           <a:lstStyle/>
           <a:p>
             <a:fld id="{E58754B6-4E19-8F42-807C-F64A7D215DCD}" type="datetimeFigureOut">
-              <a:t>22/04/2024</a:t>
+              <a:t>25/04/2024</a:t>
             </a:fld>
             <a:endParaRPr lang="fr-FR"/>
           </a:p>
@@ -449,7 +483,7 @@
           <a:lstStyle/>
           <a:p>
             <a:fld id="{E58754B6-4E19-8F42-807C-F64A7D215DCD}" type="datetimeFigureOut">
-              <a:t>22/04/2024</a:t>
+              <a:t>25/04/2024</a:t>
             </a:fld>
             <a:endParaRPr lang="fr-FR"/>
           </a:p>
@@ -655,7 +689,7 @@
           <a:lstStyle/>
           <a:p>
             <a:fld id="{E58754B6-4E19-8F42-807C-F64A7D215DCD}" type="datetimeFigureOut">
-              <a:t>22/04/2024</a:t>
+              <a:t>25/04/2024</a:t>
             </a:fld>
             <a:endParaRPr lang="fr-FR"/>
           </a:p>
@@ -851,7 +885,7 @@
           <a:lstStyle/>
           <a:p>
             <a:fld id="{E58754B6-4E19-8F42-807C-F64A7D215DCD}" type="datetimeFigureOut">
-              <a:t>22/04/2024</a:t>
+              <a:t>25/04/2024</a:t>
             </a:fld>
             <a:endParaRPr lang="fr-FR"/>
           </a:p>
@@ -1124,7 +1158,7 @@
           <a:lstStyle/>
           <a:p>
             <a:fld id="{E58754B6-4E19-8F42-807C-F64A7D215DCD}" type="datetimeFigureOut">
-              <a:t>22/04/2024</a:t>
+              <a:t>25/04/2024</a:t>
             </a:fld>
             <a:endParaRPr lang="fr-FR"/>
           </a:p>
@@ -1387,7 +1421,7 @@
           <a:lstStyle/>
           <a:p>
             <a:fld id="{E58754B6-4E19-8F42-807C-F64A7D215DCD}" type="datetimeFigureOut">
-              <a:t>22/04/2024</a:t>
+              <a:t>25/04/2024</a:t>
             </a:fld>
             <a:endParaRPr lang="fr-FR"/>
           </a:p>
@@ -1797,7 +1831,7 @@
           <a:lstStyle/>
           <a:p>
             <a:fld id="{E58754B6-4E19-8F42-807C-F64A7D215DCD}" type="datetimeFigureOut">
-              <a:t>22/04/2024</a:t>
+              <a:t>25/04/2024</a:t>
             </a:fld>
             <a:endParaRPr lang="fr-FR"/>
           </a:p>
@@ -1936,7 +1970,7 @@
           <a:lstStyle/>
           <a:p>
             <a:fld id="{E58754B6-4E19-8F42-807C-F64A7D215DCD}" type="datetimeFigureOut">
-              <a:t>22/04/2024</a:t>
+              <a:t>25/04/2024</a:t>
             </a:fld>
             <a:endParaRPr lang="fr-FR"/>
           </a:p>
@@ -2047,7 +2081,7 @@
           <a:lstStyle/>
           <a:p>
             <a:fld id="{E58754B6-4E19-8F42-807C-F64A7D215DCD}" type="datetimeFigureOut">
-              <a:t>22/04/2024</a:t>
+              <a:t>25/04/2024</a:t>
             </a:fld>
             <a:endParaRPr lang="fr-FR"/>
           </a:p>
@@ -2356,7 +2390,7 @@
           <a:lstStyle/>
           <a:p>
             <a:fld id="{E58754B6-4E19-8F42-807C-F64A7D215DCD}" type="datetimeFigureOut">
-              <a:t>22/04/2024</a:t>
+              <a:t>25/04/2024</a:t>
             </a:fld>
             <a:endParaRPr lang="fr-FR"/>
           </a:p>
@@ -2642,7 +2676,7 @@
           <a:lstStyle/>
           <a:p>
             <a:fld id="{E58754B6-4E19-8F42-807C-F64A7D215DCD}" type="datetimeFigureOut">
-              <a:t>22/04/2024</a:t>
+              <a:t>25/04/2024</a:t>
             </a:fld>
             <a:endParaRPr lang="fr-FR"/>
           </a:p>
@@ -2881,7 +2915,7 @@
           </a:lstStyle>
           <a:p>
             <a:fld id="{E58754B6-4E19-8F42-807C-F64A7D215DCD}" type="datetimeFigureOut">
-              <a:t>22/04/2024</a:t>
+              <a:t>25/04/2024</a:t>
             </a:fld>
             <a:endParaRPr lang="fr-FR"/>
           </a:p>
@@ -3352,7 +3386,7 @@
           <a:p>
             <a:r>
               <a:rPr lang="fr-FR"/>
-              <a:t>Conférence donnée à l’Ecole Centrale en novembre 2022</a:t>
+              <a:t>Conférence donnée à l’Ecole Centrale (Paris) en novembre 2022</a:t>
             </a:r>
           </a:p>
         </p:txBody>

</xml_diff>